<commit_message>
Proceso de Gestion Cambios a Requerimientos
Proceso de Gestion Cambios a Requerimientos
</commit_message>
<xml_diff>
--- a/Area_de_Proceso-_REQM/PGREQM_V1.0_2015_MOD_F.pptx
+++ b/Area_de_Proceso-_REQM/PGREQM_V1.0_2015_MOD_F.pptx
@@ -1580,7 +1580,7 @@
           <a:r>
             <a:rPr lang="es-PE" sz="1300" dirty="0" smtClean="0">
               <a:solidFill>
-                <a:srgbClr val="FF0000"/>
+                <a:schemeClr val="tx1"/>
               </a:solidFill>
               <a:latin typeface="+mj-lt"/>
             </a:rPr>
@@ -2605,7 +2605,7 @@
           <a:r>
             <a:rPr lang="es-PE" sz="1300" kern="1200" dirty="0" smtClean="0">
               <a:solidFill>
-                <a:srgbClr val="FF0000"/>
+                <a:schemeClr val="tx1"/>
               </a:solidFill>
               <a:latin typeface="+mj-lt"/>
             </a:rPr>
@@ -4360,7 +4360,7 @@
           <a:p>
             <a:fld id="{56F99C03-A70A-4B29-84B2-81DDC41A991A}" type="datetimeFigureOut">
               <a:rPr lang="es-PE" smtClean="0"/>
-              <a:t>14/10/2015</a:t>
+              <a:t>18/10/2015</a:t>
             </a:fld>
             <a:endParaRPr lang="es-PE"/>
           </a:p>
@@ -5576,7 +5576,7 @@
           <a:p>
             <a:fld id="{216C5678-EE20-4FA5-88E2-6E0BD67A2E26}" type="datetime1">
               <a:rPr lang="en-US" smtClean="0"/>
-              <a:t>10/14/2015</a:t>
+              <a:t>10/18/2015</a:t>
             </a:fld>
             <a:endParaRPr lang="en-US" dirty="0"/>
           </a:p>
@@ -5746,7 +5746,7 @@
           <a:p>
             <a:fld id="{EA051B39-B140-43FE-96DB-472A2B59CE7C}" type="datetime1">
               <a:rPr lang="en-US" smtClean="0"/>
-              <a:t>10/14/2015</a:t>
+              <a:t>10/18/2015</a:t>
             </a:fld>
             <a:endParaRPr lang="en-US"/>
           </a:p>
@@ -5926,7 +5926,7 @@
           <a:p>
             <a:fld id="{DA600BB2-27C5-458B-ABCE-839C88CF47CE}" type="datetime1">
               <a:rPr lang="en-US" smtClean="0"/>
-              <a:t>10/14/2015</a:t>
+              <a:t>10/18/2015</a:t>
             </a:fld>
             <a:endParaRPr lang="en-US"/>
           </a:p>
@@ -6339,7 +6339,7 @@
           <a:p>
             <a:fld id="{B11D738E-8962-435F-8C43-147B8DD7E819}" type="datetime1">
               <a:rPr lang="en-US" smtClean="0"/>
-              <a:t>10/14/2015</a:t>
+              <a:t>10/18/2015</a:t>
             </a:fld>
             <a:endParaRPr lang="en-US"/>
           </a:p>
@@ -6606,7 +6606,7 @@
           <a:p>
             <a:fld id="{09CAEA93-55E7-4DA9-90C2-089A26EEFEC4}" type="datetime1">
               <a:rPr lang="en-US" smtClean="0"/>
-              <a:t>10/14/2015</a:t>
+              <a:t>10/18/2015</a:t>
             </a:fld>
             <a:endParaRPr lang="en-US"/>
           </a:p>
@@ -6959,7 +6959,7 @@
           <a:p>
             <a:fld id="{E34CF3C7-6809-4F39-BD67-A75817BDDE0A}" type="datetime1">
               <a:rPr lang="en-US" smtClean="0"/>
-              <a:t>10/14/2015</a:t>
+              <a:t>10/18/2015</a:t>
             </a:fld>
             <a:endParaRPr lang="en-US"/>
           </a:p>
@@ -7272,7 +7272,7 @@
           <a:p>
             <a:fld id="{F7EAEB24-CE78-465C-A726-91D0868FA48F}" type="datetime1">
               <a:rPr lang="en-US" smtClean="0"/>
-              <a:t>10/14/2015</a:t>
+              <a:t>10/18/2015</a:t>
             </a:fld>
             <a:endParaRPr lang="en-US"/>
           </a:p>
@@ -7504,7 +7504,7 @@
           <a:p>
             <a:fld id="{40BAADF0-1749-4E8B-9691-B44A5F8C0895}" type="datetime1">
               <a:rPr lang="en-US" smtClean="0"/>
-              <a:t>10/14/2015</a:t>
+              <a:t>10/18/2015</a:t>
             </a:fld>
             <a:endParaRPr lang="en-US"/>
           </a:p>
@@ -7599,7 +7599,7 @@
           <a:p>
             <a:fld id="{A8AF628A-A867-4937-BBE5-207DB6F9C51A}" type="datetime1">
               <a:rPr lang="en-US" smtClean="0"/>
-              <a:t>10/14/2015</a:t>
+              <a:t>10/18/2015</a:t>
             </a:fld>
             <a:endParaRPr lang="en-US"/>
           </a:p>
@@ -7892,7 +7892,7 @@
           <a:p>
             <a:fld id="{118BBB94-68E6-4675-A946-F1C5994EDBD7}" type="datetime1">
               <a:rPr lang="en-US" smtClean="0"/>
-              <a:t>10/14/2015</a:t>
+              <a:t>10/18/2015</a:t>
             </a:fld>
             <a:endParaRPr lang="en-US"/>
           </a:p>
@@ -8166,7 +8166,7 @@
           <a:p>
             <a:fld id="{DC3B8377-21E3-4835-B75D-4E2847E2750F}" type="datetime1">
               <a:rPr lang="en-US" smtClean="0"/>
-              <a:t>10/14/2015</a:t>
+              <a:t>10/18/2015</a:t>
             </a:fld>
             <a:endParaRPr lang="en-US"/>
           </a:p>
@@ -8381,7 +8381,7 @@
           <a:p>
             <a:fld id="{B0C4986D-6BE9-4264-908F-02DB36FD8D6C}" type="datetime1">
               <a:rPr lang="en-US" smtClean="0"/>
-              <a:t>10/14/2015</a:t>
+              <a:t>10/18/2015</a:t>
             </a:fld>
             <a:endParaRPr lang="en-US" dirty="0"/>
           </a:p>
@@ -8923,7 +8923,7 @@
           <a:p>
             <a:fld id="{216C5678-EE20-4FA5-88E2-6E0BD67A2E26}" type="datetime1">
               <a:rPr lang="en-US" smtClean="0"/>
-              <a:t>10/14/2015</a:t>
+              <a:t>10/18/2015</a:t>
             </a:fld>
             <a:endParaRPr lang="en-US" dirty="0"/>
           </a:p>
@@ -9432,7 +9432,7 @@
           <a:p>
             <a:fld id="{216C5678-EE20-4FA5-88E2-6E0BD67A2E26}" type="datetime1">
               <a:rPr lang="en-US" smtClean="0"/>
-              <a:t>10/14/2015</a:t>
+              <a:t>10/18/2015</a:t>
             </a:fld>
             <a:endParaRPr lang="en-US" dirty="0"/>
           </a:p>
@@ -9980,7 +9980,7 @@
           <a:p>
             <a:fld id="{216C5678-EE20-4FA5-88E2-6E0BD67A2E26}" type="datetime1">
               <a:rPr lang="en-US" smtClean="0"/>
-              <a:t>10/14/2015</a:t>
+              <a:t>10/18/2015</a:t>
             </a:fld>
             <a:endParaRPr lang="en-US" dirty="0"/>
           </a:p>
@@ -10143,7 +10143,7 @@
           <a:p>
             <a:fld id="{216C5678-EE20-4FA5-88E2-6E0BD67A2E26}" type="datetime1">
               <a:rPr lang="en-US" smtClean="0"/>
-              <a:t>10/14/2015</a:t>
+              <a:t>10/18/2015</a:t>
             </a:fld>
             <a:endParaRPr lang="en-US" dirty="0"/>
           </a:p>
@@ -10394,7 +10394,7 @@
           <a:p>
             <a:fld id="{216C5678-EE20-4FA5-88E2-6E0BD67A2E26}" type="datetime1">
               <a:rPr lang="en-US" smtClean="0"/>
-              <a:t>10/14/2015</a:t>
+              <a:t>10/18/2015</a:t>
             </a:fld>
             <a:endParaRPr lang="en-US" dirty="0"/>
           </a:p>
@@ -16369,7 +16369,7 @@
                     </a:solidFill>
                     <a:latin typeface="Arial" panose="020B0604020202020204" pitchFamily="34" charset="0"/>
                   </a:rPr>
-                  <a:t>Kick</a:t>
+                  <a:t>Reunion</a:t>
                 </a:r>
                 <a:r>
                   <a:rPr lang="es-PE" altLang="es-PE" sz="1200" b="1" dirty="0" smtClean="0">
@@ -16378,17 +16378,14 @@
                     </a:solidFill>
                     <a:latin typeface="Arial" panose="020B0604020202020204" pitchFamily="34" charset="0"/>
                   </a:rPr>
-                  <a:t> </a:t>
+                  <a:t> Externa</a:t>
                 </a:r>
-                <a:r>
-                  <a:rPr lang="es-PE" altLang="es-PE" sz="1200" b="1" dirty="0">
-                    <a:solidFill>
-                      <a:schemeClr val="bg1"/>
-                    </a:solidFill>
-                    <a:latin typeface="Arial" panose="020B0604020202020204" pitchFamily="34" charset="0"/>
-                  </a:rPr>
-                  <a:t>Off Externo</a:t>
-                </a:r>
+                <a:endParaRPr lang="es-PE" altLang="es-PE" sz="1200" b="1" dirty="0">
+                  <a:solidFill>
+                    <a:schemeClr val="bg1"/>
+                  </a:solidFill>
+                  <a:latin typeface="Arial" panose="020B0604020202020204" pitchFamily="34" charset="0"/>
+                </a:endParaRPr>
               </a:p>
               <a:p>
                 <a:pPr marL="173038" indent="-79375">
@@ -17822,27 +17819,8 @@
                           <a:ea typeface="Verdana" panose="020B0604030504040204" pitchFamily="34" charset="0"/>
                           <a:cs typeface="Verdana" panose="020B0604030504040204" pitchFamily="34" charset="0"/>
                         </a:rPr>
-                        <a:t>registra la solicitud de cambio en la Plantilla de Registro de Cambios a </a:t>
+                        <a:t>registra la solicitud de cambio en la Plantilla de Registro de Cambios a Requerimientos.</a:t>
                       </a:r>
-                      <a:r>
-                        <a:rPr lang="es-ES" sz="1200" kern="1200" dirty="0" smtClean="0">
-                          <a:solidFill>
-                            <a:schemeClr val="dk1"/>
-                          </a:solidFill>
-                          <a:latin typeface="+mj-lt"/>
-                          <a:ea typeface="Verdana" panose="020B0604030504040204" pitchFamily="34" charset="0"/>
-                          <a:cs typeface="Verdana" panose="020B0604030504040204" pitchFamily="34" charset="0"/>
-                        </a:rPr>
-                        <a:t>Requerimientos.</a:t>
-                      </a:r>
-                      <a:endParaRPr lang="es-ES" sz="1200" kern="1200" dirty="0" smtClean="0">
-                        <a:solidFill>
-                          <a:schemeClr val="dk1"/>
-                        </a:solidFill>
-                        <a:latin typeface="+mj-lt"/>
-                        <a:ea typeface="Verdana" panose="020B0604030504040204" pitchFamily="34" charset="0"/>
-                        <a:cs typeface="Verdana" panose="020B0604030504040204" pitchFamily="34" charset="0"/>
-                      </a:endParaRPr>
                     </a:p>
                   </a:txBody>
                   <a:tcPr anchor="ctr" horzOverflow="overflow"/>
@@ -17957,18 +17935,7 @@
                           <a:ea typeface="Verdana" panose="020B0604030504040204" pitchFamily="34" charset="0"/>
                           <a:cs typeface="Verdana" panose="020B0604030504040204" pitchFamily="34" charset="0"/>
                         </a:rPr>
-                        <a:t>a </a:t>
-                      </a:r>
-                      <a:r>
-                        <a:rPr lang="es-ES" sz="1200" kern="1200" smtClean="0">
-                          <a:solidFill>
-                            <a:schemeClr val="dk1"/>
-                          </a:solidFill>
-                          <a:latin typeface="+mj-lt"/>
-                          <a:ea typeface="Verdana" panose="020B0604030504040204" pitchFamily="34" charset="0"/>
-                          <a:cs typeface="Verdana" panose="020B0604030504040204" pitchFamily="34" charset="0"/>
-                        </a:rPr>
-                        <a:t>Requerimientos.</a:t>
+                        <a:t>a Requerimientos.</a:t>
                       </a:r>
                       <a:endParaRPr lang="es-ES" sz="1200" kern="1200" dirty="0" smtClean="0">
                         <a:solidFill>
@@ -18490,7 +18457,7 @@
           <a:p>
             <a:fld id="{216C5678-EE20-4FA5-88E2-6E0BD67A2E26}" type="datetime1">
               <a:rPr lang="en-US" smtClean="0"/>
-              <a:t>10/14/2015</a:t>
+              <a:t>10/18/2015</a:t>
             </a:fld>
             <a:endParaRPr lang="en-US" dirty="0"/>
           </a:p>
@@ -18713,7 +18680,7 @@
           <p:nvPr>
             <p:extLst>
               <p:ext uri="{D42A27DB-BD31-4B8C-83A1-F6EECF244321}">
-                <p14:modId xmlns:p14="http://schemas.microsoft.com/office/powerpoint/2010/main" val="2450591311"/>
+                <p14:modId xmlns:p14="http://schemas.microsoft.com/office/powerpoint/2010/main" val="724308860"/>
               </p:ext>
             </p:extLst>
           </p:nvPr>
@@ -19134,7 +19101,7 @@
                       <a:r>
                         <a:rPr lang="es-ES" sz="1200" b="1" kern="1200" dirty="0" smtClean="0">
                           <a:solidFill>
-                            <a:srgbClr val="FF0000"/>
+                            <a:schemeClr val="tx1"/>
                           </a:solidFill>
                           <a:latin typeface="+mj-lt"/>
                           <a:ea typeface="Verdana" panose="020B0604030504040204" pitchFamily="34" charset="0"/>
@@ -19487,7 +19454,7 @@
           <a:p>
             <a:fld id="{216C5678-EE20-4FA5-88E2-6E0BD67A2E26}" type="datetime1">
               <a:rPr lang="en-US" smtClean="0"/>
-              <a:t>10/14/2015</a:t>
+              <a:t>10/18/2015</a:t>
             </a:fld>
             <a:endParaRPr lang="en-US" dirty="0"/>
           </a:p>
@@ -19797,7 +19764,7 @@
           <a:p>
             <a:fld id="{216C5678-EE20-4FA5-88E2-6E0BD67A2E26}" type="datetime1">
               <a:rPr lang="en-US" smtClean="0"/>
-              <a:t>10/14/2015</a:t>
+              <a:t>10/18/2015</a:t>
             </a:fld>
             <a:endParaRPr lang="en-US" dirty="0"/>
           </a:p>
@@ -20075,7 +20042,7 @@
           <a:p>
             <a:fld id="{216C5678-EE20-4FA5-88E2-6E0BD67A2E26}" type="datetime1">
               <a:rPr lang="en-US" smtClean="0"/>
-              <a:t>10/14/2015</a:t>
+              <a:t>10/18/2015</a:t>
             </a:fld>
             <a:endParaRPr lang="en-US" dirty="0"/>
           </a:p>
@@ -20277,7 +20244,7 @@
           <a:p>
             <a:fld id="{216C5678-EE20-4FA5-88E2-6E0BD67A2E26}" type="datetime1">
               <a:rPr lang="en-US" smtClean="0"/>
-              <a:t>10/14/2015</a:t>
+              <a:t>10/18/2015</a:t>
             </a:fld>
             <a:endParaRPr lang="en-US" dirty="0"/>
           </a:p>
@@ -20477,7 +20444,7 @@
           <a:p>
             <a:fld id="{216C5678-EE20-4FA5-88E2-6E0BD67A2E26}" type="datetime1">
               <a:rPr lang="en-US" smtClean="0"/>
-              <a:t>10/14/2015</a:t>
+              <a:t>10/18/2015</a:t>
             </a:fld>
             <a:endParaRPr lang="en-US" dirty="0"/>
           </a:p>
@@ -22930,7 +22897,7 @@
           <a:p>
             <a:fld id="{216C5678-EE20-4FA5-88E2-6E0BD67A2E26}" type="datetime1">
               <a:rPr lang="en-US" smtClean="0"/>
-              <a:t>10/14/2015</a:t>
+              <a:t>10/18/2015</a:t>
             </a:fld>
             <a:endParaRPr lang="en-US" dirty="0"/>
           </a:p>
@@ -25087,7 +25054,7 @@
             <a:fld id="{216C5678-EE20-4FA5-88E2-6E0BD67A2E26}" type="datetime1">
               <a:rPr lang="en-US" smtClean="0"/>
               <a:pPr/>
-              <a:t>10/14/2015</a:t>
+              <a:t>10/18/2015</a:t>
             </a:fld>
             <a:endParaRPr lang="en-US" dirty="0"/>
           </a:p>
@@ -25247,7 +25214,7 @@
           <a:p>
             <a:fld id="{216C5678-EE20-4FA5-88E2-6E0BD67A2E26}" type="datetime1">
               <a:rPr lang="en-US" smtClean="0"/>
-              <a:t>10/14/2015</a:t>
+              <a:t>10/18/2015</a:t>
             </a:fld>
             <a:endParaRPr lang="en-US" dirty="0"/>
           </a:p>
@@ -25612,7 +25579,7 @@
           <a:p>
             <a:fld id="{216C5678-EE20-4FA5-88E2-6E0BD67A2E26}" type="datetime1">
               <a:rPr lang="en-US" smtClean="0"/>
-              <a:t>10/14/2015</a:t>
+              <a:t>10/18/2015</a:t>
             </a:fld>
             <a:endParaRPr lang="en-US" dirty="0"/>
           </a:p>
@@ -25802,7 +25769,7 @@
           <a:p>
             <a:fld id="{216C5678-EE20-4FA5-88E2-6E0BD67A2E26}" type="datetime1">
               <a:rPr lang="en-US" smtClean="0"/>
-              <a:t>10/14/2015</a:t>
+              <a:t>10/18/2015</a:t>
             </a:fld>
             <a:endParaRPr lang="en-US" dirty="0"/>
           </a:p>
@@ -26531,7 +26498,7 @@
           <a:p>
             <a:fld id="{216C5678-EE20-4FA5-88E2-6E0BD67A2E26}" type="datetime1">
               <a:rPr lang="en-US" smtClean="0"/>
-              <a:t>10/14/2015</a:t>
+              <a:t>10/18/2015</a:t>
             </a:fld>
             <a:endParaRPr lang="en-US" dirty="0"/>
           </a:p>
@@ -26694,7 +26661,7 @@
           <a:p>
             <a:fld id="{216C5678-EE20-4FA5-88E2-6E0BD67A2E26}" type="datetime1">
               <a:rPr lang="en-US" smtClean="0"/>
-              <a:t>10/14/2015</a:t>
+              <a:t>10/18/2015</a:t>
             </a:fld>
             <a:endParaRPr lang="en-US" dirty="0"/>
           </a:p>
@@ -26856,7 +26823,7 @@
           <p:nvPr>
             <p:extLst>
               <p:ext uri="{D42A27DB-BD31-4B8C-83A1-F6EECF244321}">
-                <p14:modId xmlns:p14="http://schemas.microsoft.com/office/powerpoint/2010/main" val="1325886543"/>
+                <p14:modId xmlns:p14="http://schemas.microsoft.com/office/powerpoint/2010/main" val="1070679485"/>
               </p:ext>
             </p:extLst>
           </p:nvPr>
@@ -26920,7 +26887,7 @@
           <a:p>
             <a:fld id="{216C5678-EE20-4FA5-88E2-6E0BD67A2E26}" type="datetime1">
               <a:rPr lang="en-US" smtClean="0"/>
-              <a:t>10/14/2015</a:t>
+              <a:t>10/18/2015</a:t>
             </a:fld>
             <a:endParaRPr lang="en-US" dirty="0"/>
           </a:p>

</xml_diff>